<commit_message>
Exp 2 Discussion & Conclusion
</commit_message>
<xml_diff>
--- a/PHY2026/Experiment_2/Final_Report/atom_setup.pptx
+++ b/PHY2026/Experiment_2/Final_Report/atom_setup.pptx
@@ -104,6 +104,11 @@
       </a:defRPr>
     </a:lvl9pPr>
   </p:defaultTextStyle>
+  <p:extLst>
+    <p:ext uri="{EFAFB233-063F-42B5-8137-9DF3F51BA10A}">
+      <p15:sldGuideLst xmlns:p15="http://schemas.microsoft.com/office/powerpoint/2012/main"/>
+    </p:ext>
+  </p:extLst>
 </p:presentation>
 </file>
 
@@ -238,7 +243,7 @@
           <a:p>
             <a:fld id="{BEAA7B3D-9410-4CB2-BFCC-EC3B66F3E72B}" type="datetimeFigureOut">
               <a:rPr lang="en-GB" smtClean="0"/>
-              <a:t>18/11/2018</a:t>
+              <a:t>01/12/2018</a:t>
             </a:fld>
             <a:endParaRPr lang="en-GB"/>
           </a:p>
@@ -408,7 +413,7 @@
           <a:p>
             <a:fld id="{BEAA7B3D-9410-4CB2-BFCC-EC3B66F3E72B}" type="datetimeFigureOut">
               <a:rPr lang="en-GB" smtClean="0"/>
-              <a:t>18/11/2018</a:t>
+              <a:t>01/12/2018</a:t>
             </a:fld>
             <a:endParaRPr lang="en-GB"/>
           </a:p>
@@ -588,7 +593,7 @@
           <a:p>
             <a:fld id="{BEAA7B3D-9410-4CB2-BFCC-EC3B66F3E72B}" type="datetimeFigureOut">
               <a:rPr lang="en-GB" smtClean="0"/>
-              <a:t>18/11/2018</a:t>
+              <a:t>01/12/2018</a:t>
             </a:fld>
             <a:endParaRPr lang="en-GB"/>
           </a:p>
@@ -758,7 +763,7 @@
           <a:p>
             <a:fld id="{BEAA7B3D-9410-4CB2-BFCC-EC3B66F3E72B}" type="datetimeFigureOut">
               <a:rPr lang="en-GB" smtClean="0"/>
-              <a:t>18/11/2018</a:t>
+              <a:t>01/12/2018</a:t>
             </a:fld>
             <a:endParaRPr lang="en-GB"/>
           </a:p>
@@ -1004,7 +1009,7 @@
           <a:p>
             <a:fld id="{BEAA7B3D-9410-4CB2-BFCC-EC3B66F3E72B}" type="datetimeFigureOut">
               <a:rPr lang="en-GB" smtClean="0"/>
-              <a:t>18/11/2018</a:t>
+              <a:t>01/12/2018</a:t>
             </a:fld>
             <a:endParaRPr lang="en-GB"/>
           </a:p>
@@ -1236,7 +1241,7 @@
           <a:p>
             <a:fld id="{BEAA7B3D-9410-4CB2-BFCC-EC3B66F3E72B}" type="datetimeFigureOut">
               <a:rPr lang="en-GB" smtClean="0"/>
-              <a:t>18/11/2018</a:t>
+              <a:t>01/12/2018</a:t>
             </a:fld>
             <a:endParaRPr lang="en-GB"/>
           </a:p>
@@ -1603,7 +1608,7 @@
           <a:p>
             <a:fld id="{BEAA7B3D-9410-4CB2-BFCC-EC3B66F3E72B}" type="datetimeFigureOut">
               <a:rPr lang="en-GB" smtClean="0"/>
-              <a:t>18/11/2018</a:t>
+              <a:t>01/12/2018</a:t>
             </a:fld>
             <a:endParaRPr lang="en-GB"/>
           </a:p>
@@ -1721,7 +1726,7 @@
           <a:p>
             <a:fld id="{BEAA7B3D-9410-4CB2-BFCC-EC3B66F3E72B}" type="datetimeFigureOut">
               <a:rPr lang="en-GB" smtClean="0"/>
-              <a:t>18/11/2018</a:t>
+              <a:t>01/12/2018</a:t>
             </a:fld>
             <a:endParaRPr lang="en-GB"/>
           </a:p>
@@ -1816,7 +1821,7 @@
           <a:p>
             <a:fld id="{BEAA7B3D-9410-4CB2-BFCC-EC3B66F3E72B}" type="datetimeFigureOut">
               <a:rPr lang="en-GB" smtClean="0"/>
-              <a:t>18/11/2018</a:t>
+              <a:t>01/12/2018</a:t>
             </a:fld>
             <a:endParaRPr lang="en-GB"/>
           </a:p>
@@ -2093,7 +2098,7 @@
           <a:p>
             <a:fld id="{BEAA7B3D-9410-4CB2-BFCC-EC3B66F3E72B}" type="datetimeFigureOut">
               <a:rPr lang="en-GB" smtClean="0"/>
-              <a:t>18/11/2018</a:t>
+              <a:t>01/12/2018</a:t>
             </a:fld>
             <a:endParaRPr lang="en-GB"/>
           </a:p>
@@ -2346,7 +2351,7 @@
           <a:p>
             <a:fld id="{BEAA7B3D-9410-4CB2-BFCC-EC3B66F3E72B}" type="datetimeFigureOut">
               <a:rPr lang="en-GB" smtClean="0"/>
-              <a:t>18/11/2018</a:t>
+              <a:t>01/12/2018</a:t>
             </a:fld>
             <a:endParaRPr lang="en-GB"/>
           </a:p>
@@ -2559,7 +2564,7 @@
           <a:p>
             <a:fld id="{BEAA7B3D-9410-4CB2-BFCC-EC3B66F3E72B}" type="datetimeFigureOut">
               <a:rPr lang="en-GB" smtClean="0"/>
-              <a:t>18/11/2018</a:t>
+              <a:t>01/12/2018</a:t>
             </a:fld>
             <a:endParaRPr lang="en-GB"/>
           </a:p>
@@ -3003,7 +3008,7 @@
         <p:spPr>
           <a:xfrm>
             <a:off x="691977" y="1202724"/>
-            <a:ext cx="1502033" cy="307777"/>
+            <a:ext cx="1502033" cy="707886"/>
           </a:xfrm>
           <a:prstGeom prst="rect">
             <a:avLst/>
@@ -3018,13 +3023,13 @@
           <a:p>
             <a:pPr algn="ctr"/>
             <a:r>
-              <a:rPr lang="en-GB" sz="1400" dirty="0" smtClean="0">
+              <a:rPr lang="en-GB" sz="2000" dirty="0" smtClean="0">
                 <a:latin typeface="Times New Roman" panose="02020603050405020304" pitchFamily="18" charset="0"/>
                 <a:cs typeface="Times New Roman" panose="02020603050405020304" pitchFamily="18" charset="0"/>
               </a:rPr>
               <a:t>Voltage Source</a:t>
             </a:r>
-            <a:endParaRPr lang="en-GB" sz="1400" dirty="0">
+            <a:endParaRPr lang="en-GB" sz="2000" dirty="0">
               <a:latin typeface="Times New Roman" panose="02020603050405020304" pitchFamily="18" charset="0"/>
               <a:cs typeface="Times New Roman" panose="02020603050405020304" pitchFamily="18" charset="0"/>
             </a:endParaRPr>
@@ -3076,7 +3081,7 @@
         <p:spPr>
           <a:xfrm>
             <a:off x="626076" y="4258390"/>
-            <a:ext cx="1576172" cy="307777"/>
+            <a:ext cx="1576172" cy="707886"/>
           </a:xfrm>
           <a:prstGeom prst="rect">
             <a:avLst/>
@@ -3091,13 +3096,13 @@
           <a:p>
             <a:pPr algn="ctr"/>
             <a:r>
-              <a:rPr lang="en-GB" sz="1400" dirty="0" smtClean="0">
+              <a:rPr lang="en-GB" sz="2000" dirty="0" smtClean="0">
                 <a:latin typeface="Times New Roman" panose="02020603050405020304" pitchFamily="18" charset="0"/>
                 <a:cs typeface="Times New Roman" panose="02020603050405020304" pitchFamily="18" charset="0"/>
               </a:rPr>
               <a:t>Diffraction Grating</a:t>
             </a:r>
-            <a:endParaRPr lang="en-GB" sz="1400" dirty="0">
+            <a:endParaRPr lang="en-GB" sz="2000" dirty="0">
               <a:latin typeface="Times New Roman" panose="02020603050405020304" pitchFamily="18" charset="0"/>
               <a:cs typeface="Times New Roman" panose="02020603050405020304" pitchFamily="18" charset="0"/>
             </a:endParaRPr>
@@ -3107,15 +3112,13 @@
       <p:cxnSp>
         <p:nvCxnSpPr>
           <p:cNvPr id="12" name="Straight Arrow Connector 11"/>
-          <p:cNvCxnSpPr>
-            <a:stCxn id="11" idx="3"/>
-          </p:cNvCxnSpPr>
+          <p:cNvCxnSpPr/>
           <p:nvPr/>
         </p:nvCxnSpPr>
         <p:spPr>
           <a:xfrm flipV="1">
-            <a:off x="2202248" y="4077730"/>
-            <a:ext cx="1381211" cy="334549"/>
+            <a:off x="1960605" y="4077733"/>
+            <a:ext cx="1622854" cy="551932"/>
           </a:xfrm>
           <a:prstGeom prst="straightConnector1">
             <a:avLst/>
@@ -3152,8 +3155,8 @@
             </p:nvSpPr>
             <p:spPr>
               <a:xfrm>
-                <a:off x="10033687" y="1441622"/>
-                <a:ext cx="1112107" cy="954107"/>
+                <a:off x="9945814" y="883715"/>
+                <a:ext cx="1227437" cy="1631216"/>
               </a:xfrm>
               <a:prstGeom prst="rect">
                 <a:avLst/>
@@ -3168,7 +3171,7 @@
               <a:p>
                 <a:pPr algn="ctr"/>
                 <a:r>
-                  <a:rPr lang="en-GB" sz="1400" dirty="0" smtClean="0">
+                  <a:rPr lang="en-GB" sz="2000" dirty="0" smtClean="0">
                     <a:latin typeface="Times New Roman" panose="02020603050405020304" pitchFamily="18" charset="0"/>
                     <a:cs typeface="Times New Roman" panose="02020603050405020304" pitchFamily="18" charset="0"/>
                   </a:rPr>
@@ -3177,25 +3180,25 @@
                 <a14:m>
                   <m:oMath xmlns:m="http://schemas.openxmlformats.org/officeDocument/2006/math">
                     <m:r>
-                      <a:rPr lang="en-GB" sz="1400" i="1" smtClean="0">
+                      <a:rPr lang="en-GB" sz="2000" i="1" smtClean="0">
                         <a:latin typeface="Cambria Math" panose="02040503050406030204" pitchFamily="18" charset="0"/>
                       </a:rPr>
                       <m:t>𝑙</m:t>
                     </m:r>
                   </m:oMath>
                 </a14:m>
-                <a:endParaRPr lang="en-GB" sz="1400" dirty="0"/>
+                <a:endParaRPr lang="en-GB" sz="2000" dirty="0"/>
               </a:p>
               <a:p>
                 <a:pPr algn="ctr"/>
                 <a:r>
-                  <a:rPr lang="en-GB" sz="1400" dirty="0" smtClean="0">
+                  <a:rPr lang="en-GB" sz="2000" dirty="0" smtClean="0">
                     <a:latin typeface="Times New Roman" panose="02020603050405020304" pitchFamily="18" charset="0"/>
                     <a:cs typeface="Times New Roman" panose="02020603050405020304" pitchFamily="18" charset="0"/>
                   </a:rPr>
                   <a:t> </a:t>
                 </a:r>
-                <a:endParaRPr lang="en-GB" sz="1400" dirty="0">
+                <a:endParaRPr lang="en-GB" sz="2000" dirty="0">
                   <a:latin typeface="Times New Roman" panose="02020603050405020304" pitchFamily="18" charset="0"/>
                   <a:cs typeface="Times New Roman" panose="02020603050405020304" pitchFamily="18" charset="0"/>
                 </a:endParaRPr>
@@ -3214,8 +3217,8 @@
             </p:nvSpPr>
             <p:spPr>
               <a:xfrm>
-                <a:off x="10033687" y="1441622"/>
-                <a:ext cx="1112107" cy="954107"/>
+                <a:off x="9945814" y="883715"/>
+                <a:ext cx="1227437" cy="1631216"/>
               </a:xfrm>
               <a:prstGeom prst="rect">
                 <a:avLst/>
@@ -3223,7 +3226,7 @@
               <a:blipFill rotWithShape="0">
                 <a:blip r:embed="rId3"/>
                 <a:stretch>
-                  <a:fillRect t="-637" r="-1648"/>
+                  <a:fillRect l="-3980" t="-2239" r="-3483"/>
                 </a:stretch>
               </a:blipFill>
             </p:spPr>
@@ -3288,8 +3291,8 @@
             </p:nvSpPr>
             <p:spPr>
               <a:xfrm>
-                <a:off x="10033687" y="4566167"/>
-                <a:ext cx="1672280" cy="523220"/>
+                <a:off x="9926593" y="4566167"/>
+                <a:ext cx="1672280" cy="1015663"/>
               </a:xfrm>
               <a:prstGeom prst="rect">
                 <a:avLst/>
@@ -3302,8 +3305,9 @@
               </a:bodyPr>
               <a:lstStyle/>
               <a:p>
+                <a:pPr algn="ctr"/>
                 <a:r>
-                  <a:rPr lang="en-GB" sz="1400" dirty="0" smtClean="0">
+                  <a:rPr lang="en-GB" sz="2000" dirty="0" smtClean="0">
                     <a:latin typeface="Times New Roman" panose="02020603050405020304" pitchFamily="18" charset="0"/>
                     <a:cs typeface="Times New Roman" panose="02020603050405020304" pitchFamily="18" charset="0"/>
                   </a:rPr>
@@ -3312,7 +3316,7 @@
                 <a14:m>
                   <m:oMath xmlns:m="http://schemas.openxmlformats.org/officeDocument/2006/math">
                     <m:r>
-                      <a:rPr lang="en-GB" sz="1400" b="0" i="1" smtClean="0">
+                      <a:rPr lang="en-GB" sz="2000" b="0" i="1" smtClean="0">
                         <a:latin typeface="Cambria Math" panose="02040503050406030204" pitchFamily="18" charset="0"/>
                         <a:cs typeface="Times New Roman" panose="02020603050405020304" pitchFamily="18" charset="0"/>
                       </a:rPr>
@@ -3320,10 +3324,11 @@
                     </m:r>
                   </m:oMath>
                 </a14:m>
-                <a:endParaRPr lang="en-GB" sz="1400" dirty="0"/>
+                <a:endParaRPr lang="en-GB" sz="2000" dirty="0"/>
               </a:p>
               <a:p>
-                <a:endParaRPr lang="en-GB" sz="1400" dirty="0">
+                <a:pPr algn="ctr"/>
+                <a:endParaRPr lang="en-GB" sz="2000" dirty="0">
                   <a:latin typeface="Times New Roman" panose="02020603050405020304" pitchFamily="18" charset="0"/>
                   <a:cs typeface="Times New Roman" panose="02020603050405020304" pitchFamily="18" charset="0"/>
                 </a:endParaRPr>
@@ -3342,8 +3347,8 @@
             </p:nvSpPr>
             <p:spPr>
               <a:xfrm>
-                <a:off x="10033687" y="4566167"/>
-                <a:ext cx="1672280" cy="523220"/>
+                <a:off x="9926593" y="4566167"/>
+                <a:ext cx="1672280" cy="1015663"/>
               </a:xfrm>
               <a:prstGeom prst="rect">
                 <a:avLst/>
@@ -3351,7 +3356,7 @@
               <a:blipFill rotWithShape="0">
                 <a:blip r:embed="rId4"/>
                 <a:stretch>
-                  <a:fillRect l="-1095" t="-3488"/>
+                  <a:fillRect t="-2994"/>
                 </a:stretch>
               </a:blipFill>
             </p:spPr>
@@ -3373,15 +3378,13 @@
       <p:cxnSp>
         <p:nvCxnSpPr>
           <p:cNvPr id="20" name="Straight Arrow Connector 19"/>
-          <p:cNvCxnSpPr>
-            <a:stCxn id="18" idx="1"/>
-          </p:cNvCxnSpPr>
+          <p:cNvCxnSpPr/>
           <p:nvPr/>
         </p:nvCxnSpPr>
         <p:spPr>
           <a:xfrm flipH="1">
-            <a:off x="4324866" y="4827777"/>
-            <a:ext cx="5708821" cy="724526"/>
+            <a:off x="4217774" y="4894038"/>
+            <a:ext cx="6095999" cy="658265"/>
           </a:xfrm>
           <a:prstGeom prst="straightConnector1">
             <a:avLst/>
@@ -3417,7 +3420,7 @@
         <p:spPr>
           <a:xfrm>
             <a:off x="9945814" y="3061219"/>
-            <a:ext cx="1502033" cy="307777"/>
+            <a:ext cx="1502033" cy="707886"/>
           </a:xfrm>
           <a:prstGeom prst="rect">
             <a:avLst/>
@@ -3432,13 +3435,13 @@
           <a:p>
             <a:pPr algn="ctr"/>
             <a:r>
-              <a:rPr lang="en-GB" sz="1400" dirty="0" smtClean="0">
+              <a:rPr lang="en-GB" sz="2000" dirty="0" smtClean="0">
                 <a:latin typeface="Times New Roman" panose="02020603050405020304" pitchFamily="18" charset="0"/>
                 <a:cs typeface="Times New Roman" panose="02020603050405020304" pitchFamily="18" charset="0"/>
               </a:rPr>
               <a:t>Spectral Tube</a:t>
             </a:r>
-            <a:endParaRPr lang="en-GB" sz="1400" dirty="0">
+            <a:endParaRPr lang="en-GB" sz="2000" dirty="0">
               <a:latin typeface="Times New Roman" panose="02020603050405020304" pitchFamily="18" charset="0"/>
               <a:cs typeface="Times New Roman" panose="02020603050405020304" pitchFamily="18" charset="0"/>
             </a:endParaRPr>

</xml_diff>